<commit_message>
small changes on short presentation
</commit_message>
<xml_diff>
--- a/docs/presentation/EDocs_presentation_short.pptx
+++ b/docs/presentation/EDocs_presentation_short.pptx
@@ -3625,7 +3625,7 @@
             </a:r>
             <a:r>
               <a:rPr lang="en-US" sz="2400" dirty="0"/>
-              <a:t> stores all documents received from another users (companies or persons) in a simple and personalized way.</a:t>
+              <a:t> stores all documents received from another users in the same place.</a:t>
             </a:r>
           </a:p>
           <a:p>
@@ -3646,7 +3646,7 @@
             </a:r>
             <a:r>
               <a:rPr lang="en-US" sz="2400" dirty="0"/>
-              <a:t> all documents will be in the same place and you’ll be able to view them, download them or resend to other users.</a:t>
+              <a:t> you can sign documents and request to receive a signed response.</a:t>
             </a:r>
           </a:p>
           <a:p>
@@ -3663,11 +3663,45 @@
             </a:r>
             <a:r>
               <a:rPr lang="en-US" sz="2400" dirty="0"/>
-              <a:t> allows you to decide who can send you documents, having total control to accept or reject documents from </a:t>
+              <a:t> allows you to decide from who can you receive documents.</a:t>
+            </a:r>
+          </a:p>
+          <a:p>
+            <a:pPr marL="0" indent="0" algn="just">
+              <a:buNone/>
+            </a:pPr>
+            <a:r>
+              <a:rPr lang="en-US" sz="2400" b="1" dirty="0">
+                <a:solidFill>
+                  <a:srgbClr val="FF5E00"/>
+                </a:solidFill>
+              </a:rPr>
+              <a:t>eDocs </a:t>
+            </a:r>
+            <a:r>
+              <a:rPr lang="en-US" sz="2400" dirty="0"/>
+              <a:t>create documents that can be read by machines.</a:t>
+            </a:r>
+          </a:p>
+          <a:p>
+            <a:pPr marL="0" indent="0" algn="just">
+              <a:buNone/>
+            </a:pPr>
+            <a:r>
+              <a:rPr lang="en-US" sz="2400" b="1" dirty="0">
+                <a:solidFill>
+                  <a:srgbClr val="FF5E00"/>
+                </a:solidFill>
+              </a:rPr>
+              <a:t>eDocs </a:t>
+            </a:r>
+            <a:r>
+              <a:rPr lang="en-US" sz="2400" dirty="0"/>
+              <a:t>has multiple API’s that allows to deal with large amount </a:t>
             </a:r>
             <a:r>
               <a:rPr lang="en-US" sz="2400"/>
-              <a:t>other users.</a:t>
+              <a:t>of transactions.</a:t>
             </a:r>
             <a:endParaRPr lang="en-US" sz="2400" dirty="0"/>
           </a:p>

</xml_diff>

<commit_message>
Created buttons and legends
</commit_message>
<xml_diff>
--- a/docs/presentation/EDocs_presentation_short.pptx
+++ b/docs/presentation/EDocs_presentation_short.pptx
@@ -3625,7 +3625,7 @@
             </a:r>
             <a:r>
               <a:rPr lang="en-US" sz="2400" dirty="0"/>
-              <a:t> stores all documents received from another users in the same place.</a:t>
+              <a:t> stores all documents received from another users (companies or persons) in a simple and personalized way.</a:t>
             </a:r>
           </a:p>
           <a:p>
@@ -3646,7 +3646,7 @@
             </a:r>
             <a:r>
               <a:rPr lang="en-US" sz="2400" dirty="0"/>
-              <a:t> you can sign documents and request to receive a signed response.</a:t>
+              <a:t> all documents will be in the same place and you’ll be able to view them, download them or resend to other users.</a:t>
             </a:r>
           </a:p>
           <a:p>
@@ -3663,45 +3663,11 @@
             </a:r>
             <a:r>
               <a:rPr lang="en-US" sz="2400" dirty="0"/>
-              <a:t> allows you to decide from who can you receive documents.</a:t>
-            </a:r>
-          </a:p>
-          <a:p>
-            <a:pPr marL="0" indent="0" algn="just">
-              <a:buNone/>
-            </a:pPr>
-            <a:r>
-              <a:rPr lang="en-US" sz="2400" b="1" dirty="0">
-                <a:solidFill>
-                  <a:srgbClr val="FF5E00"/>
-                </a:solidFill>
-              </a:rPr>
-              <a:t>eDocs </a:t>
-            </a:r>
-            <a:r>
-              <a:rPr lang="en-US" sz="2400" dirty="0"/>
-              <a:t>create documents that can be read by machines.</a:t>
-            </a:r>
-          </a:p>
-          <a:p>
-            <a:pPr marL="0" indent="0" algn="just">
-              <a:buNone/>
-            </a:pPr>
-            <a:r>
-              <a:rPr lang="en-US" sz="2400" b="1" dirty="0">
-                <a:solidFill>
-                  <a:srgbClr val="FF5E00"/>
-                </a:solidFill>
-              </a:rPr>
-              <a:t>eDocs </a:t>
-            </a:r>
-            <a:r>
-              <a:rPr lang="en-US" sz="2400" dirty="0"/>
-              <a:t>has multiple API’s that allows to deal with large amount </a:t>
+              <a:t> allows you to decide who can send you documents, having total control to accept or reject documents from </a:t>
             </a:r>
             <a:r>
               <a:rPr lang="en-US" sz="2400"/>
-              <a:t>of transactions.</a:t>
+              <a:t>other users.</a:t>
             </a:r>
             <a:endParaRPr lang="en-US" sz="2400" dirty="0"/>
           </a:p>

</xml_diff>

<commit_message>
Upload previous commit xD
</commit_message>
<xml_diff>
--- a/docs/presentation/EDocs_presentation_short.pptx
+++ b/docs/presentation/EDocs_presentation_short.pptx
@@ -3625,7 +3625,7 @@
             </a:r>
             <a:r>
               <a:rPr lang="en-US" sz="2400" dirty="0"/>
-              <a:t> stores all documents received from another users (companies or persons) in a simple and personalized way.</a:t>
+              <a:t> stores all documents received from another users in the same place.</a:t>
             </a:r>
           </a:p>
           <a:p>
@@ -3646,7 +3646,7 @@
             </a:r>
             <a:r>
               <a:rPr lang="en-US" sz="2400" dirty="0"/>
-              <a:t> all documents will be in the same place and you’ll be able to view them, download them or resend to other users.</a:t>
+              <a:t> you can sign documents and request to receive a signed response.</a:t>
             </a:r>
           </a:p>
           <a:p>
@@ -3663,11 +3663,45 @@
             </a:r>
             <a:r>
               <a:rPr lang="en-US" sz="2400" dirty="0"/>
-              <a:t> allows you to decide who can send you documents, having total control to accept or reject documents from </a:t>
+              <a:t> allows you to decide from who can you receive documents.</a:t>
+            </a:r>
+          </a:p>
+          <a:p>
+            <a:pPr marL="0" indent="0" algn="just">
+              <a:buNone/>
+            </a:pPr>
+            <a:r>
+              <a:rPr lang="en-US" sz="2400" b="1" dirty="0">
+                <a:solidFill>
+                  <a:srgbClr val="FF5E00"/>
+                </a:solidFill>
+              </a:rPr>
+              <a:t>eDocs </a:t>
+            </a:r>
+            <a:r>
+              <a:rPr lang="en-US" sz="2400" dirty="0"/>
+              <a:t>create documents that can be read by machines.</a:t>
+            </a:r>
+          </a:p>
+          <a:p>
+            <a:pPr marL="0" indent="0" algn="just">
+              <a:buNone/>
+            </a:pPr>
+            <a:r>
+              <a:rPr lang="en-US" sz="2400" b="1" dirty="0">
+                <a:solidFill>
+                  <a:srgbClr val="FF5E00"/>
+                </a:solidFill>
+              </a:rPr>
+              <a:t>eDocs </a:t>
+            </a:r>
+            <a:r>
+              <a:rPr lang="en-US" sz="2400" dirty="0"/>
+              <a:t>has multiple API’s that allows to deal with large amount </a:t>
             </a:r>
             <a:r>
               <a:rPr lang="en-US" sz="2400"/>
-              <a:t>other users.</a:t>
+              <a:t>of transactions.</a:t>
             </a:r>
             <a:endParaRPr lang="en-US" sz="2400" dirty="0"/>
           </a:p>

</xml_diff>

<commit_message>
small fixes on presentation
</commit_message>
<xml_diff>
--- a/docs/presentation/EDocs_presentation_short.pptx
+++ b/docs/presentation/EDocs_presentation_short.pptx
@@ -3645,7 +3645,7 @@
             </a:pPr>
             <a:r>
               <a:rPr lang="en-US" sz="2400" dirty="0"/>
-              <a:t>Any legal document ends, at the end, into a database, so, why do we need them in paper? </a:t>
+              <a:t>Some downloaded documents are printed, filled, send and type into a database, so, why do we need them in paper? </a:t>
             </a:r>
           </a:p>
           <a:p>
@@ -3654,13 +3654,8 @@
             </a:pPr>
             <a:r>
               <a:rPr lang="en-US" sz="2400" dirty="0"/>
-              <a:t>Paper work is tedious, slow and expensive but, if </a:t>
-            </a:r>
-            <a:r>
-              <a:rPr lang="en-US" sz="2400"/>
-              <a:t>it is digital…</a:t>
-            </a:r>
-            <a:endParaRPr lang="en-US" sz="2400" dirty="0"/>
+              <a:t>Paper work is tedious, slow and expensive but, if it is digital…</a:t>
+            </a:r>
           </a:p>
           <a:p>
             <a:pPr marL="0" indent="0" algn="just">
@@ -4724,10 +4719,6 @@
               <a:buNone/>
             </a:pPr>
             <a:r>
-              <a:rPr lang="en-US" sz="2400" dirty="0"/>
-              <a:t>With </a:t>
-            </a:r>
-            <a:r>
               <a:rPr lang="en-US" sz="2400" b="1" dirty="0">
                 <a:solidFill>
                   <a:srgbClr val="FF5E00"/>
@@ -4737,13 +4728,17 @@
             </a:r>
             <a:r>
               <a:rPr lang="en-US" sz="2400" dirty="0"/>
-              <a:t> you can sign documents and request to receive a signed response.</a:t>
+              <a:t> allows you to decide from who can you receive documents.</a:t>
             </a:r>
           </a:p>
           <a:p>
             <a:pPr marL="0" indent="0" algn="just">
               <a:buNone/>
             </a:pPr>
+            <a:r>
+              <a:rPr lang="en-US" sz="2400" dirty="0"/>
+              <a:t>With </a:t>
+            </a:r>
             <a:r>
               <a:rPr lang="en-US" sz="2400" b="1" dirty="0">
                 <a:solidFill>
@@ -4754,7 +4749,7 @@
             </a:r>
             <a:r>
               <a:rPr lang="en-US" sz="2400" dirty="0"/>
-              <a:t> allows you to decide from who can you receive documents.</a:t>
+              <a:t> you can sign documents and request to receive a signed response.</a:t>
             </a:r>
           </a:p>
           <a:p>
@@ -4788,13 +4783,8 @@
             </a:r>
             <a:r>
               <a:rPr lang="en-US" sz="2400" dirty="0"/>
-              <a:t>has multiple API’s that allows to deal with large amount </a:t>
-            </a:r>
-            <a:r>
-              <a:rPr lang="en-US" sz="2400"/>
-              <a:t>of transactions.</a:t>
-            </a:r>
-            <a:endParaRPr lang="en-US" sz="2400" dirty="0"/>
+              <a:t>has multiple API’s that allows to deal with large amount of transactions.</a:t>
+            </a:r>
           </a:p>
         </p:txBody>
       </p:sp>
@@ -6390,10 +6380,10 @@
       </p:sp>
       <p:grpSp>
         <p:nvGrpSpPr>
-          <p:cNvPr id="18" name="Grupo 17">
+          <p:cNvPr id="41" name="Grupo 40">
             <a:extLst>
               <a:ext uri="{FF2B5EF4-FFF2-40B4-BE49-F238E27FC236}">
-                <a16:creationId xmlns:a16="http://schemas.microsoft.com/office/drawing/2014/main" id="{8146C0BD-CE06-43CC-A0A4-E303D3C52BED}"/>
+                <a16:creationId xmlns:a16="http://schemas.microsoft.com/office/drawing/2014/main" id="{59FF3C1D-9E4B-44B6-A968-7F3CB458FE70}"/>
               </a:ext>
             </a:extLst>
           </p:cNvPr>
@@ -6402,18 +6392,54 @@
         </p:nvGrpSpPr>
         <p:grpSpPr>
           <a:xfrm>
-            <a:off x="3271310" y="5194296"/>
-            <a:ext cx="5649380" cy="1213841"/>
-            <a:chOff x="4291501" y="5238791"/>
-            <a:chExt cx="5649380" cy="1213841"/>
+            <a:off x="3846074" y="5194296"/>
+            <a:ext cx="4490856" cy="1213841"/>
+            <a:chOff x="3459064" y="5584720"/>
+            <a:chExt cx="4490856" cy="1213841"/>
           </a:xfrm>
         </p:grpSpPr>
+        <p:pic>
+          <p:nvPicPr>
+            <p:cNvPr id="43" name="Imagen 42">
+              <a:extLst>
+                <a:ext uri="{FF2B5EF4-FFF2-40B4-BE49-F238E27FC236}">
+                  <a16:creationId xmlns:a16="http://schemas.microsoft.com/office/drawing/2014/main" id="{AB42CEDF-DC69-40C2-94C8-46B8587A2D2C}"/>
+                </a:ext>
+              </a:extLst>
+            </p:cNvPr>
+            <p:cNvPicPr>
+              <a:picLocks noChangeAspect="1"/>
+            </p:cNvPicPr>
+            <p:nvPr/>
+          </p:nvPicPr>
+          <p:blipFill>
+            <a:blip r:embed="rId10">
+              <a:extLst>
+                <a:ext uri="{28A0092B-C50C-407E-A947-70E740481C1C}">
+                  <a14:useLocalDpi xmlns:a14="http://schemas.microsoft.com/office/drawing/2010/main" val="0"/>
+                </a:ext>
+              </a:extLst>
+            </a:blip>
+            <a:stretch>
+              <a:fillRect/>
+            </a:stretch>
+          </p:blipFill>
+          <p:spPr>
+            <a:xfrm>
+              <a:off x="6736079" y="5584720"/>
+              <a:ext cx="1213841" cy="1213841"/>
+            </a:xfrm>
+            <a:prstGeom prst="rect">
+              <a:avLst/>
+            </a:prstGeom>
+          </p:spPr>
+        </p:pic>
         <p:grpSp>
           <p:nvGrpSpPr>
-            <p:cNvPr id="41" name="Grupo 40">
+            <p:cNvPr id="47" name="Grupo 46">
               <a:extLst>
                 <a:ext uri="{FF2B5EF4-FFF2-40B4-BE49-F238E27FC236}">
-                  <a16:creationId xmlns:a16="http://schemas.microsoft.com/office/drawing/2014/main" id="{59FF3C1D-9E4B-44B6-A968-7F3CB458FE70}"/>
+                  <a16:creationId xmlns:a16="http://schemas.microsoft.com/office/drawing/2014/main" id="{B981D5E4-3F13-48E3-AFBC-1008BAC3DCFE}"/>
                 </a:ext>
               </a:extLst>
             </p:cNvPr>
@@ -6422,18 +6448,18 @@
           </p:nvGrpSpPr>
           <p:grpSpPr>
             <a:xfrm>
-              <a:off x="4291501" y="5238791"/>
-              <a:ext cx="4490856" cy="1213841"/>
-              <a:chOff x="3459064" y="5584720"/>
-              <a:chExt cx="4490856" cy="1213841"/>
+              <a:off x="3459064" y="5772145"/>
+              <a:ext cx="3112404" cy="838993"/>
+              <a:chOff x="3459064" y="5772145"/>
+              <a:chExt cx="3112404" cy="838993"/>
             </a:xfrm>
           </p:grpSpPr>
           <p:pic>
             <p:nvPicPr>
-              <p:cNvPr id="43" name="Imagen 42">
+              <p:cNvPr id="50" name="Imagen 49">
                 <a:extLst>
                   <a:ext uri="{FF2B5EF4-FFF2-40B4-BE49-F238E27FC236}">
-                    <a16:creationId xmlns:a16="http://schemas.microsoft.com/office/drawing/2014/main" id="{AB42CEDF-DC69-40C2-94C8-46B8587A2D2C}"/>
+                    <a16:creationId xmlns:a16="http://schemas.microsoft.com/office/drawing/2014/main" id="{20907EB6-CADB-414F-A45C-470B388AC7B7}"/>
                   </a:ext>
                 </a:extLst>
               </p:cNvPr>
@@ -6443,7 +6469,7 @@
               <p:nvPr/>
             </p:nvPicPr>
             <p:blipFill>
-              <a:blip r:embed="rId10">
+              <a:blip r:embed="rId11">
                 <a:extLst>
                   <a:ext uri="{28A0092B-C50C-407E-A947-70E740481C1C}">
                     <a14:useLocalDpi xmlns:a14="http://schemas.microsoft.com/office/drawing/2010/main" val="0"/>
@@ -6456,189 +6482,87 @@
             </p:blipFill>
             <p:spPr>
               <a:xfrm>
-                <a:off x="6736079" y="5584720"/>
-                <a:ext cx="1213841" cy="1213841"/>
+                <a:off x="3459064" y="5805488"/>
+                <a:ext cx="772308" cy="772308"/>
               </a:xfrm>
               <a:prstGeom prst="rect">
                 <a:avLst/>
               </a:prstGeom>
             </p:spPr>
           </p:pic>
-          <p:grpSp>
-            <p:nvGrpSpPr>
-              <p:cNvPr id="47" name="Grupo 46">
+          <p:pic>
+            <p:nvPicPr>
+              <p:cNvPr id="51" name="Imagen 50">
                 <a:extLst>
                   <a:ext uri="{FF2B5EF4-FFF2-40B4-BE49-F238E27FC236}">
-                    <a16:creationId xmlns:a16="http://schemas.microsoft.com/office/drawing/2014/main" id="{B981D5E4-3F13-48E3-AFBC-1008BAC3DCFE}"/>
+                    <a16:creationId xmlns:a16="http://schemas.microsoft.com/office/drawing/2014/main" id="{3802E0D4-6CFE-43EA-8E80-95BCDAE1A987}"/>
                   </a:ext>
                 </a:extLst>
               </p:cNvPr>
-              <p:cNvGrpSpPr/>
+              <p:cNvPicPr>
+                <a:picLocks noChangeAspect="1"/>
+              </p:cNvPicPr>
               <p:nvPr/>
-            </p:nvGrpSpPr>
-            <p:grpSpPr>
+            </p:nvPicPr>
+            <p:blipFill>
+              <a:blip r:embed="rId12">
+                <a:extLst>
+                  <a:ext uri="{28A0092B-C50C-407E-A947-70E740481C1C}">
+                    <a14:useLocalDpi xmlns:a14="http://schemas.microsoft.com/office/drawing/2010/main" val="0"/>
+                  </a:ext>
+                </a:extLst>
+              </a:blip>
+              <a:stretch>
+                <a:fillRect/>
+              </a:stretch>
+            </p:blipFill>
+            <p:spPr>
               <a:xfrm>
-                <a:off x="3459064" y="5772145"/>
-                <a:ext cx="3112404" cy="838993"/>
-                <a:chOff x="3459064" y="5772145"/>
-                <a:chExt cx="3112404" cy="838993"/>
+                <a:off x="5904383" y="5837523"/>
+                <a:ext cx="667085" cy="772414"/>
               </a:xfrm>
-            </p:grpSpPr>
-            <p:pic>
-              <p:nvPicPr>
-                <p:cNvPr id="50" name="Imagen 49">
-                  <a:extLst>
-                    <a:ext uri="{FF2B5EF4-FFF2-40B4-BE49-F238E27FC236}">
-                      <a16:creationId xmlns:a16="http://schemas.microsoft.com/office/drawing/2014/main" id="{20907EB6-CADB-414F-A45C-470B388AC7B7}"/>
-                    </a:ext>
-                  </a:extLst>
-                </p:cNvPr>
-                <p:cNvPicPr>
-                  <a:picLocks noChangeAspect="1"/>
-                </p:cNvPicPr>
-                <p:nvPr/>
-              </p:nvPicPr>
-              <p:blipFill>
-                <a:blip r:embed="rId11">
-                  <a:extLst>
-                    <a:ext uri="{28A0092B-C50C-407E-A947-70E740481C1C}">
-                      <a14:useLocalDpi xmlns:a14="http://schemas.microsoft.com/office/drawing/2010/main" val="0"/>
-                    </a:ext>
-                  </a:extLst>
-                </a:blip>
-                <a:stretch>
-                  <a:fillRect/>
-                </a:stretch>
-              </p:blipFill>
-              <p:spPr>
-                <a:xfrm>
-                  <a:off x="3459064" y="5805488"/>
-                  <a:ext cx="772308" cy="772308"/>
-                </a:xfrm>
-                <a:prstGeom prst="rect">
-                  <a:avLst/>
-                </a:prstGeom>
-              </p:spPr>
-            </p:pic>
-            <p:pic>
-              <p:nvPicPr>
-                <p:cNvPr id="51" name="Imagen 50">
-                  <a:extLst>
-                    <a:ext uri="{FF2B5EF4-FFF2-40B4-BE49-F238E27FC236}">
-                      <a16:creationId xmlns:a16="http://schemas.microsoft.com/office/drawing/2014/main" id="{3802E0D4-6CFE-43EA-8E80-95BCDAE1A987}"/>
-                    </a:ext>
-                  </a:extLst>
-                </p:cNvPr>
-                <p:cNvPicPr>
-                  <a:picLocks noChangeAspect="1"/>
-                </p:cNvPicPr>
-                <p:nvPr/>
-              </p:nvPicPr>
-              <p:blipFill>
-                <a:blip r:embed="rId12">
-                  <a:extLst>
-                    <a:ext uri="{28A0092B-C50C-407E-A947-70E740481C1C}">
-                      <a14:useLocalDpi xmlns:a14="http://schemas.microsoft.com/office/drawing/2010/main" val="0"/>
-                    </a:ext>
-                  </a:extLst>
-                </a:blip>
-                <a:stretch>
-                  <a:fillRect/>
-                </a:stretch>
-              </p:blipFill>
-              <p:spPr>
-                <a:xfrm>
-                  <a:off x="5904383" y="5837523"/>
-                  <a:ext cx="667085" cy="772414"/>
-                </a:xfrm>
-                <a:prstGeom prst="rect">
-                  <a:avLst/>
-                </a:prstGeom>
-              </p:spPr>
-            </p:pic>
-            <p:pic>
-              <p:nvPicPr>
-                <p:cNvPr id="52" name="Imagen 51">
-                  <a:extLst>
-                    <a:ext uri="{FF2B5EF4-FFF2-40B4-BE49-F238E27FC236}">
-                      <a16:creationId xmlns:a16="http://schemas.microsoft.com/office/drawing/2014/main" id="{326EBBFA-57F0-4A73-AC56-8D57781C0D12}"/>
-                    </a:ext>
-                  </a:extLst>
-                </p:cNvPr>
-                <p:cNvPicPr>
-                  <a:picLocks noChangeAspect="1"/>
-                </p:cNvPicPr>
-                <p:nvPr/>
-              </p:nvPicPr>
-              <p:blipFill>
-                <a:blip r:embed="rId13">
-                  <a:extLst>
-                    <a:ext uri="{28A0092B-C50C-407E-A947-70E740481C1C}">
-                      <a14:useLocalDpi xmlns:a14="http://schemas.microsoft.com/office/drawing/2010/main" val="0"/>
-                    </a:ext>
-                  </a:extLst>
-                </a:blip>
-                <a:stretch>
-                  <a:fillRect/>
-                </a:stretch>
-              </p:blipFill>
-              <p:spPr>
-                <a:xfrm>
-                  <a:off x="4648381" y="5772145"/>
-                  <a:ext cx="838993" cy="838993"/>
-                </a:xfrm>
-                <a:prstGeom prst="rect">
-                  <a:avLst/>
-                </a:prstGeom>
-              </p:spPr>
-            </p:pic>
-          </p:grpSp>
+              <a:prstGeom prst="rect">
+                <a:avLst/>
+              </a:prstGeom>
+            </p:spPr>
+          </p:pic>
+          <p:pic>
+            <p:nvPicPr>
+              <p:cNvPr id="52" name="Imagen 51">
+                <a:extLst>
+                  <a:ext uri="{FF2B5EF4-FFF2-40B4-BE49-F238E27FC236}">
+                    <a16:creationId xmlns:a16="http://schemas.microsoft.com/office/drawing/2014/main" id="{326EBBFA-57F0-4A73-AC56-8D57781C0D12}"/>
+                  </a:ext>
+                </a:extLst>
+              </p:cNvPr>
+              <p:cNvPicPr>
+                <a:picLocks noChangeAspect="1"/>
+              </p:cNvPicPr>
+              <p:nvPr/>
+            </p:nvPicPr>
+            <p:blipFill>
+              <a:blip r:embed="rId13">
+                <a:extLst>
+                  <a:ext uri="{28A0092B-C50C-407E-A947-70E740481C1C}">
+                    <a14:useLocalDpi xmlns:a14="http://schemas.microsoft.com/office/drawing/2010/main" val="0"/>
+                  </a:ext>
+                </a:extLst>
+              </a:blip>
+              <a:stretch>
+                <a:fillRect/>
+              </a:stretch>
+            </p:blipFill>
+            <p:spPr>
+              <a:xfrm>
+                <a:off x="4648381" y="5772145"/>
+                <a:ext cx="838993" cy="838993"/>
+              </a:xfrm>
+              <a:prstGeom prst="rect">
+                <a:avLst/>
+              </a:prstGeom>
+            </p:spPr>
+          </p:pic>
         </p:grpSp>
-        <p:pic>
-          <p:nvPicPr>
-            <p:cNvPr id="1038" name="Picture 14" descr="Resultado de imagen de php 7 icon">
-              <a:extLst>
-                <a:ext uri="{FF2B5EF4-FFF2-40B4-BE49-F238E27FC236}">
-                  <a16:creationId xmlns:a16="http://schemas.microsoft.com/office/drawing/2014/main" id="{7ADE8C09-AB4C-47E3-B462-B8B13C95F0E4}"/>
-                </a:ext>
-              </a:extLst>
-            </p:cNvPr>
-            <p:cNvPicPr>
-              <a:picLocks noChangeAspect="1" noChangeArrowheads="1"/>
-            </p:cNvPicPr>
-            <p:nvPr/>
-          </p:nvPicPr>
-          <p:blipFill rotWithShape="1">
-            <a:blip r:embed="rId14">
-              <a:extLst>
-                <a:ext uri="{28A0092B-C50C-407E-A947-70E740481C1C}">
-                  <a14:useLocalDpi xmlns:a14="http://schemas.microsoft.com/office/drawing/2010/main" val="0"/>
-                </a:ext>
-              </a:extLst>
-            </a:blip>
-            <a:srcRect l="28.819%" t="23.848%" r="30.038%" b="15.612%"/>
-            <a:stretch/>
-          </p:blipFill>
-          <p:spPr bwMode="auto">
-            <a:xfrm>
-              <a:off x="8894630" y="5491594"/>
-              <a:ext cx="1046251" cy="854438"/>
-            </a:xfrm>
-            <a:prstGeom prst="rect">
-              <a:avLst/>
-            </a:prstGeom>
-            <a:noFill/>
-            <a:extLst>
-              <a:ext uri="{909E8E84-426E-40DD-AFC4-6F175D3DCCD1}">
-                <a14:hiddenFill xmlns:a14="http://schemas.microsoft.com/office/drawing/2010/main">
-                  <a:solidFill>
-                    <a:srgbClr val="FFFFFF"/>
-                  </a:solidFill>
-                </a14:hiddenFill>
-              </a:ext>
-            </a:extLst>
-          </p:spPr>
-        </p:pic>
       </p:grpSp>
     </p:spTree>
     <p:extLst>

</xml_diff>